<commit_message>
edited seq diagram for visitweb
</commit_message>
<xml_diff>
--- a/docs/diagrams/VisitWebSequenceDiagram.pptx
+++ b/docs/diagrams/VisitWebSequenceDiagram.pptx
@@ -212,7 +212,7 @@
           <a:p>
             <a:fld id="{F5CC4B3F-88C1-4FFA-B1B6-F41C21DC6924}" type="datetimeFigureOut">
               <a:rPr lang="en-US" smtClean="0"/>
-              <a:t>19-Mar-19</a:t>
+              <a:t>02-Apr-19</a:t>
             </a:fld>
             <a:endParaRPr lang="en-US"/>
           </a:p>
@@ -658,7 +658,7 @@
           <a:p>
             <a:fld id="{78C97017-6FC3-485B-9764-EAC9E56C1D49}" type="datetimeFigureOut">
               <a:rPr lang="en-US" smtClean="0"/>
-              <a:t>19-Mar-19</a:t>
+              <a:t>02-Apr-19</a:t>
             </a:fld>
             <a:endParaRPr lang="en-US"/>
           </a:p>
@@ -826,7 +826,7 @@
           <a:p>
             <a:fld id="{78C97017-6FC3-485B-9764-EAC9E56C1D49}" type="datetimeFigureOut">
               <a:rPr lang="en-US" smtClean="0"/>
-              <a:t>19-Mar-19</a:t>
+              <a:t>02-Apr-19</a:t>
             </a:fld>
             <a:endParaRPr lang="en-US"/>
           </a:p>
@@ -1004,7 +1004,7 @@
           <a:p>
             <a:fld id="{78C97017-6FC3-485B-9764-EAC9E56C1D49}" type="datetimeFigureOut">
               <a:rPr lang="en-US" smtClean="0"/>
-              <a:t>19-Mar-19</a:t>
+              <a:t>02-Apr-19</a:t>
             </a:fld>
             <a:endParaRPr lang="en-US"/>
           </a:p>
@@ -1172,7 +1172,7 @@
           <a:p>
             <a:fld id="{78C97017-6FC3-485B-9764-EAC9E56C1D49}" type="datetimeFigureOut">
               <a:rPr lang="en-US" smtClean="0"/>
-              <a:t>19-Mar-19</a:t>
+              <a:t>02-Apr-19</a:t>
             </a:fld>
             <a:endParaRPr lang="en-US"/>
           </a:p>
@@ -1417,7 +1417,7 @@
           <a:p>
             <a:fld id="{78C97017-6FC3-485B-9764-EAC9E56C1D49}" type="datetimeFigureOut">
               <a:rPr lang="en-US" smtClean="0"/>
-              <a:t>19-Mar-19</a:t>
+              <a:t>02-Apr-19</a:t>
             </a:fld>
             <a:endParaRPr lang="en-US"/>
           </a:p>
@@ -1702,7 +1702,7 @@
           <a:p>
             <a:fld id="{78C97017-6FC3-485B-9764-EAC9E56C1D49}" type="datetimeFigureOut">
               <a:rPr lang="en-US" smtClean="0"/>
-              <a:t>19-Mar-19</a:t>
+              <a:t>02-Apr-19</a:t>
             </a:fld>
             <a:endParaRPr lang="en-US"/>
           </a:p>
@@ -2121,7 +2121,7 @@
           <a:p>
             <a:fld id="{78C97017-6FC3-485B-9764-EAC9E56C1D49}" type="datetimeFigureOut">
               <a:rPr lang="en-US" smtClean="0"/>
-              <a:t>19-Mar-19</a:t>
+              <a:t>02-Apr-19</a:t>
             </a:fld>
             <a:endParaRPr lang="en-US"/>
           </a:p>
@@ -2238,7 +2238,7 @@
           <a:p>
             <a:fld id="{78C97017-6FC3-485B-9764-EAC9E56C1D49}" type="datetimeFigureOut">
               <a:rPr lang="en-US" smtClean="0"/>
-              <a:t>19-Mar-19</a:t>
+              <a:t>02-Apr-19</a:t>
             </a:fld>
             <a:endParaRPr lang="en-US"/>
           </a:p>
@@ -2333,7 +2333,7 @@
           <a:p>
             <a:fld id="{78C97017-6FC3-485B-9764-EAC9E56C1D49}" type="datetimeFigureOut">
               <a:rPr lang="en-US" smtClean="0"/>
-              <a:t>19-Mar-19</a:t>
+              <a:t>02-Apr-19</a:t>
             </a:fld>
             <a:endParaRPr lang="en-US"/>
           </a:p>
@@ -2608,7 +2608,7 @@
           <a:p>
             <a:fld id="{78C97017-6FC3-485B-9764-EAC9E56C1D49}" type="datetimeFigureOut">
               <a:rPr lang="en-US" smtClean="0"/>
-              <a:t>19-Mar-19</a:t>
+              <a:t>02-Apr-19</a:t>
             </a:fld>
             <a:endParaRPr lang="en-US"/>
           </a:p>
@@ -2860,7 +2860,7 @@
           <a:p>
             <a:fld id="{78C97017-6FC3-485B-9764-EAC9E56C1D49}" type="datetimeFigureOut">
               <a:rPr lang="en-US" smtClean="0"/>
-              <a:t>19-Mar-19</a:t>
+              <a:t>02-Apr-19</a:t>
             </a:fld>
             <a:endParaRPr lang="en-US"/>
           </a:p>
@@ -3071,7 +3071,7 @@
           <a:p>
             <a:fld id="{78C97017-6FC3-485B-9764-EAC9E56C1D49}" type="datetimeFigureOut">
               <a:rPr lang="en-US" smtClean="0"/>
-              <a:t>19-Mar-19</a:t>
+              <a:t>02-Apr-19</a:t>
             </a:fld>
             <a:endParaRPr lang="en-US"/>
           </a:p>
@@ -3998,7 +3998,7 @@
           </a:prstGeom>
           <a:ln w="19050">
             <a:solidFill>
-              <a:srgbClr val="00B050"/>
+              <a:srgbClr val="0070C0"/>
             </a:solidFill>
             <a:tailEnd type="arrow"/>
           </a:ln>
@@ -4761,7 +4761,7 @@
           <p:cNvPr id="66" name="Straight Arrow Connector 65">
             <a:extLst>
               <a:ext uri="{FF2B5EF4-FFF2-40B4-BE49-F238E27FC236}">
-                <a16:creationId xmlns="" xmlns:a16="http://schemas.microsoft.com/office/drawing/2014/main" id="{39916E2E-195A-4DC8-B025-B05FA87E6796}"/>
+                <a16:creationId xmlns:a16="http://schemas.microsoft.com/office/drawing/2014/main" xmlns="" id="{39916E2E-195A-4DC8-B025-B05FA87E6796}"/>
               </a:ext>
             </a:extLst>
           </p:cNvPr>
@@ -4805,7 +4805,7 @@
           <p:cNvPr id="67" name="Straight Arrow Connector 66">
             <a:extLst>
               <a:ext uri="{FF2B5EF4-FFF2-40B4-BE49-F238E27FC236}">
-                <a16:creationId xmlns="" xmlns:a16="http://schemas.microsoft.com/office/drawing/2014/main" id="{D881596E-177C-4FDC-8E60-CAB90B3D5FAB}"/>
+                <a16:creationId xmlns:a16="http://schemas.microsoft.com/office/drawing/2014/main" xmlns="" id="{D881596E-177C-4FDC-8E60-CAB90B3D5FAB}"/>
               </a:ext>
             </a:extLst>
           </p:cNvPr>
@@ -4849,7 +4849,7 @@
           <p:cNvPr id="69" name="Straight Arrow Connector 68">
             <a:extLst>
               <a:ext uri="{FF2B5EF4-FFF2-40B4-BE49-F238E27FC236}">
-                <a16:creationId xmlns="" xmlns:a16="http://schemas.microsoft.com/office/drawing/2014/main" id="{7C9F21BC-13A9-471F-825A-2621FD36355F}"/>
+                <a16:creationId xmlns:a16="http://schemas.microsoft.com/office/drawing/2014/main" xmlns="" id="{7C9F21BC-13A9-471F-825A-2621FD36355F}"/>
               </a:ext>
             </a:extLst>
           </p:cNvPr>
@@ -4895,7 +4895,7 @@
           <p:cNvPr id="63" name="Straight Arrow Connector 62">
             <a:extLst>
               <a:ext uri="{FF2B5EF4-FFF2-40B4-BE49-F238E27FC236}">
-                <a16:creationId xmlns="" xmlns:a16="http://schemas.microsoft.com/office/drawing/2014/main" id="{7C9F21BC-13A9-471F-825A-2621FD36355F}"/>
+                <a16:creationId xmlns:a16="http://schemas.microsoft.com/office/drawing/2014/main" xmlns="" id="{7C9F21BC-13A9-471F-825A-2621FD36355F}"/>
               </a:ext>
             </a:extLst>
           </p:cNvPr>
@@ -5122,9 +5122,9 @@
           <p:nvPr/>
         </p:nvCxnSpPr>
         <p:spPr>
-          <a:xfrm flipH="1">
-            <a:off x="7234625" y="3165659"/>
-            <a:ext cx="3959" cy="1735710"/>
+          <a:xfrm>
+            <a:off x="7238585" y="3165659"/>
+            <a:ext cx="415" cy="1598728"/>
           </a:xfrm>
           <a:prstGeom prst="line">
             <a:avLst/>
@@ -5157,7 +5157,7 @@
           <p:cNvPr id="70" name="Straight Arrow Connector 69">
             <a:extLst>
               <a:ext uri="{FF2B5EF4-FFF2-40B4-BE49-F238E27FC236}">
-                <a16:creationId xmlns="" xmlns:a16="http://schemas.microsoft.com/office/drawing/2014/main" id="{7C9F21BC-13A9-471F-825A-2621FD36355F}"/>
+                <a16:creationId xmlns:a16="http://schemas.microsoft.com/office/drawing/2014/main" xmlns="" id="{7C9F21BC-13A9-471F-825A-2621FD36355F}"/>
               </a:ext>
             </a:extLst>
           </p:cNvPr>
@@ -5206,7 +5206,7 @@
         </p:nvSpPr>
         <p:spPr>
           <a:xfrm>
-            <a:off x="8482903" y="2880088"/>
+            <a:off x="8389702" y="2872560"/>
             <a:ext cx="1472754" cy="346760"/>
           </a:xfrm>
           <a:prstGeom prst="rect">
@@ -5283,7 +5283,7 @@
           </a:prstGeom>
           <a:ln w="19050">
             <a:solidFill>
-              <a:srgbClr val="7030A0"/>
+              <a:srgbClr val="00B050"/>
             </a:solidFill>
             <a:tailEnd type="arrow"/>
           </a:ln>
@@ -5312,9 +5312,9 @@
           <p:nvPr/>
         </p:nvCxnSpPr>
         <p:spPr>
-          <a:xfrm flipH="1">
-            <a:off x="9122119" y="3226848"/>
-            <a:ext cx="3959" cy="1735710"/>
+          <a:xfrm>
+            <a:off x="9108226" y="3228174"/>
+            <a:ext cx="17921" cy="1537539"/>
           </a:xfrm>
           <a:prstGeom prst="line">
             <a:avLst/>
@@ -5347,7 +5347,7 @@
           <p:cNvPr id="74" name="Straight Arrow Connector 73">
             <a:extLst>
               <a:ext uri="{FF2B5EF4-FFF2-40B4-BE49-F238E27FC236}">
-                <a16:creationId xmlns="" xmlns:a16="http://schemas.microsoft.com/office/drawing/2014/main" id="{7C9F21BC-13A9-471F-825A-2621FD36355F}"/>
+                <a16:creationId xmlns:a16="http://schemas.microsoft.com/office/drawing/2014/main" xmlns="" id="{7C9F21BC-13A9-471F-825A-2621FD36355F}"/>
               </a:ext>
             </a:extLst>
           </p:cNvPr>
@@ -5402,6 +5402,9 @@
           <a:prstGeom prst="rect">
             <a:avLst/>
           </a:prstGeom>
+          <a:ln>
+            <a:noFill/>
+          </a:ln>
         </p:spPr>
         <p:txBody>
           <a:bodyPr wrap="square">
@@ -5412,9 +5415,7 @@
             <a:r>
               <a:rPr lang="en-US" sz="900" dirty="0" err="1" smtClean="0">
                 <a:solidFill>
-                  <a:schemeClr val="accent4">
-                    <a:lumMod val="75000"/>
-                  </a:schemeClr>
+                  <a:srgbClr val="00B050"/>
                 </a:solidFill>
               </a:rPr>
               <a:t>loadPage</a:t>
@@ -5422,9 +5423,7 @@
             <a:r>
               <a:rPr lang="en-US" sz="900" dirty="0" smtClean="0">
                 <a:solidFill>
-                  <a:schemeClr val="accent4">
-                    <a:lumMod val="75000"/>
-                  </a:schemeClr>
+                  <a:srgbClr val="00B050"/>
                 </a:solidFill>
               </a:rPr>
               <a:t>(</a:t>
@@ -5432,9 +5431,7 @@
             <a:r>
               <a:rPr lang="en-US" sz="900" dirty="0" err="1" smtClean="0">
                 <a:solidFill>
-                  <a:schemeClr val="accent4">
-                    <a:lumMod val="75000"/>
-                  </a:schemeClr>
+                  <a:srgbClr val="00B050"/>
                 </a:solidFill>
               </a:rPr>
               <a:t>Restaurant.weblink</a:t>
@@ -5442,18 +5439,14 @@
             <a:r>
               <a:rPr lang="en-US" sz="900" dirty="0" smtClean="0">
                 <a:solidFill>
-                  <a:schemeClr val="accent4">
-                    <a:lumMod val="75000"/>
-                  </a:schemeClr>
+                  <a:srgbClr val="00B050"/>
                 </a:solidFill>
               </a:rPr>
               <a:t>)</a:t>
             </a:r>
             <a:endParaRPr lang="en-US" sz="900" dirty="0">
               <a:solidFill>
-                <a:schemeClr val="accent4">
-                  <a:lumMod val="75000"/>
-                </a:schemeClr>
+                <a:srgbClr val="00B050"/>
               </a:solidFill>
             </a:endParaRPr>
           </a:p>

</xml_diff>